<commit_message>
Atualização de arquivos 3
</commit_message>
<xml_diff>
--- a/docs/Apresentação.pptx
+++ b/docs/Apresentação.pptx
@@ -5,14 +5,15 @@
     <p:sldMasterId id="2147483648" r:id="rId1"/>
   </p:sldMasterIdLst>
   <p:sldIdLst>
-    <p:sldId id="256" r:id="rId2"/>
-    <p:sldId id="257" r:id="rId3"/>
-    <p:sldId id="258" r:id="rId4"/>
-    <p:sldId id="259" r:id="rId5"/>
-    <p:sldId id="260" r:id="rId6"/>
-    <p:sldId id="262" r:id="rId7"/>
-    <p:sldId id="261" r:id="rId8"/>
-    <p:sldId id="263" r:id="rId9"/>
+    <p:sldId id="264" r:id="rId2"/>
+    <p:sldId id="256" r:id="rId3"/>
+    <p:sldId id="257" r:id="rId4"/>
+    <p:sldId id="258" r:id="rId5"/>
+    <p:sldId id="259" r:id="rId6"/>
+    <p:sldId id="260" r:id="rId7"/>
+    <p:sldId id="262" r:id="rId8"/>
+    <p:sldId id="261" r:id="rId9"/>
+    <p:sldId id="263" r:id="rId10"/>
   </p:sldIdLst>
   <p:sldSz cx="12192000" cy="6858000"/>
   <p:notesSz cx="6858000" cy="9144000"/>
@@ -3328,6 +3329,315 @@
           <a:chExt cx="0" cy="0"/>
         </a:xfrm>
       </p:grpSpPr>
+      <p:sp>
+        <p:nvSpPr>
+          <p:cNvPr id="3" name="CaixaDeTexto 2">
+            <a:extLst>
+              <a:ext uri="{FF2B5EF4-FFF2-40B4-BE49-F238E27FC236}">
+                <a16:creationId xmlns:a16="http://schemas.microsoft.com/office/drawing/2014/main" id="{628BE51E-8110-205C-7817-4964745E2B90}"/>
+              </a:ext>
+            </a:extLst>
+          </p:cNvPr>
+          <p:cNvSpPr txBox="1"/>
+          <p:nvPr/>
+        </p:nvSpPr>
+        <p:spPr>
+          <a:xfrm>
+            <a:off x="373626" y="473248"/>
+            <a:ext cx="9163664" cy="369332"/>
+          </a:xfrm>
+          <a:prstGeom prst="rect">
+            <a:avLst/>
+          </a:prstGeom>
+          <a:noFill/>
+        </p:spPr>
+        <p:txBody>
+          <a:bodyPr wrap="square">
+            <a:spAutoFit/>
+          </a:bodyPr>
+          <a:lstStyle/>
+          <a:p>
+            <a:r>
+              <a:rPr lang="pt-BR" dirty="0"/>
+              <a:t>Monitoramento de Enfestos com ESP32 e Análise de Dados com Python e </a:t>
+            </a:r>
+            <a:r>
+              <a:rPr lang="pt-BR" dirty="0" err="1"/>
+              <a:t>SQLite</a:t>
+            </a:r>
+            <a:endParaRPr lang="pt-BR" dirty="0"/>
+          </a:p>
+        </p:txBody>
+      </p:sp>
+      <p:sp>
+        <p:nvSpPr>
+          <p:cNvPr id="5" name="CaixaDeTexto 4">
+            <a:extLst>
+              <a:ext uri="{FF2B5EF4-FFF2-40B4-BE49-F238E27FC236}">
+                <a16:creationId xmlns:a16="http://schemas.microsoft.com/office/drawing/2014/main" id="{DF942B47-4D8E-7F44-3204-E19EC559408C}"/>
+              </a:ext>
+            </a:extLst>
+          </p:cNvPr>
+          <p:cNvSpPr txBox="1"/>
+          <p:nvPr/>
+        </p:nvSpPr>
+        <p:spPr>
+          <a:xfrm>
+            <a:off x="235974" y="5407743"/>
+            <a:ext cx="6096000" cy="1200329"/>
+          </a:xfrm>
+          <a:prstGeom prst="rect">
+            <a:avLst/>
+          </a:prstGeom>
+          <a:noFill/>
+        </p:spPr>
+        <p:txBody>
+          <a:bodyPr wrap="square">
+            <a:spAutoFit/>
+          </a:bodyPr>
+          <a:lstStyle/>
+          <a:p>
+            <a:pPr>
+              <a:buNone/>
+            </a:pPr>
+            <a:r>
+              <a:rPr lang="pt-BR" b="1" dirty="0"/>
+              <a:t>Integrantes do Grupo</a:t>
+            </a:r>
+          </a:p>
+          <a:p>
+            <a:r>
+              <a:rPr lang="pt-BR" b="1" dirty="0"/>
+              <a:t>Thiago Scutari – RM562831</a:t>
+            </a:r>
+            <a:br>
+              <a:rPr lang="pt-BR" dirty="0"/>
+            </a:br>
+            <a:r>
+              <a:rPr lang="pt-BR" b="1" dirty="0"/>
+              <a:t>Henrique Ribeiro Siqueira – RM565044</a:t>
+            </a:r>
+            <a:br>
+              <a:rPr lang="pt-BR" dirty="0"/>
+            </a:br>
+            <a:r>
+              <a:rPr lang="pt-BR" b="1" dirty="0"/>
+              <a:t>Mariana Cavalcante Oliveira – RM561678</a:t>
+            </a:r>
+            <a:endParaRPr lang="pt-BR" dirty="0"/>
+          </a:p>
+        </p:txBody>
+      </p:sp>
+      <p:sp>
+        <p:nvSpPr>
+          <p:cNvPr id="7" name="CaixaDeTexto 6">
+            <a:extLst>
+              <a:ext uri="{FF2B5EF4-FFF2-40B4-BE49-F238E27FC236}">
+                <a16:creationId xmlns:a16="http://schemas.microsoft.com/office/drawing/2014/main" id="{1E148127-7CA2-B2BB-F7C0-EC37277DC693}"/>
+              </a:ext>
+            </a:extLst>
+          </p:cNvPr>
+          <p:cNvSpPr txBox="1"/>
+          <p:nvPr/>
+        </p:nvSpPr>
+        <p:spPr>
+          <a:xfrm>
+            <a:off x="4955458" y="5810866"/>
+            <a:ext cx="6096000" cy="646331"/>
+          </a:xfrm>
+          <a:prstGeom prst="rect">
+            <a:avLst/>
+          </a:prstGeom>
+          <a:noFill/>
+        </p:spPr>
+        <p:txBody>
+          <a:bodyPr wrap="square">
+            <a:spAutoFit/>
+          </a:bodyPr>
+          <a:lstStyle/>
+          <a:p>
+            <a:pPr>
+              <a:buNone/>
+            </a:pPr>
+            <a:r>
+              <a:rPr lang="pt-BR" b="1" dirty="0"/>
+              <a:t>Repositório do Projeto</a:t>
+            </a:r>
+          </a:p>
+          <a:p>
+            <a:r>
+              <a:rPr lang="pt-BR" dirty="0"/>
+              <a:t>🔗 </a:t>
+            </a:r>
+            <a:r>
+              <a:rPr lang="pt-BR" dirty="0">
+                <a:hlinkClick r:id="rId2"/>
+              </a:rPr>
+              <a:t>github.com/</a:t>
+            </a:r>
+            <a:r>
+              <a:rPr lang="pt-BR" dirty="0" err="1">
+                <a:hlinkClick r:id="rId2"/>
+              </a:rPr>
+              <a:t>ThiagoScutari</a:t>
+            </a:r>
+            <a:r>
+              <a:rPr lang="pt-BR" dirty="0">
+                <a:hlinkClick r:id="rId2"/>
+              </a:rPr>
+              <a:t>/sprint_2</a:t>
+            </a:r>
+            <a:endParaRPr lang="pt-BR" dirty="0"/>
+          </a:p>
+        </p:txBody>
+      </p:sp>
+      <p:sp>
+        <p:nvSpPr>
+          <p:cNvPr id="9" name="CaixaDeTexto 8">
+            <a:extLst>
+              <a:ext uri="{FF2B5EF4-FFF2-40B4-BE49-F238E27FC236}">
+                <a16:creationId xmlns:a16="http://schemas.microsoft.com/office/drawing/2014/main" id="{C3257A49-B2B8-C2AC-B9D3-0BC2B12B5FDA}"/>
+              </a:ext>
+            </a:extLst>
+          </p:cNvPr>
+          <p:cNvSpPr txBox="1"/>
+          <p:nvPr/>
+        </p:nvSpPr>
+        <p:spPr>
+          <a:xfrm>
+            <a:off x="373626" y="1289380"/>
+            <a:ext cx="11051457" cy="2862322"/>
+          </a:xfrm>
+          <a:prstGeom prst="rect">
+            <a:avLst/>
+          </a:prstGeom>
+          <a:noFill/>
+        </p:spPr>
+        <p:txBody>
+          <a:bodyPr wrap="square">
+            <a:spAutoFit/>
+          </a:bodyPr>
+          <a:lstStyle/>
+          <a:p>
+            <a:pPr>
+              <a:buNone/>
+            </a:pPr>
+            <a:r>
+              <a:rPr lang="pt-BR" b="1" dirty="0"/>
+              <a:t>Descrição</a:t>
+            </a:r>
+          </a:p>
+          <a:p>
+            <a:pPr>
+              <a:buNone/>
+            </a:pPr>
+            <a:r>
+              <a:rPr lang="pt-BR" dirty="0"/>
+              <a:t>Este projeto tem como objetivo simular um processo de </a:t>
+            </a:r>
+            <a:r>
+              <a:rPr lang="pt-BR" b="1" dirty="0"/>
+              <a:t>monitoramento de enfesto industrial</a:t>
+            </a:r>
+            <a:r>
+              <a:rPr lang="pt-BR" dirty="0"/>
+              <a:t>, utilizando um </a:t>
+            </a:r>
+            <a:r>
+              <a:rPr lang="pt-BR" b="1" dirty="0"/>
+              <a:t>sensor ultrassônico conectado ao ESP32</a:t>
+            </a:r>
+            <a:r>
+              <a:rPr lang="pt-BR" dirty="0"/>
+              <a:t>, cuja leitura é capturada via protocolo RFC2217 e registrada em um banco de dados local (SQLite3).</a:t>
+            </a:r>
+          </a:p>
+          <a:p>
+            <a:pPr>
+              <a:buNone/>
+            </a:pPr>
+            <a:r>
+              <a:rPr lang="pt-BR" dirty="0"/>
+              <a:t>Os dados capturados incluem distância, data/hora, código da máquina e ordem de produção. A partir disso, o sistema identifica o número de “folhas” movimentadas no enfesto (ida e volta da máquina) e permite:</a:t>
+            </a:r>
+          </a:p>
+          <a:p>
+            <a:pPr>
+              <a:buFont typeface="Arial" panose="020B0604020202020204" pitchFamily="34" charset="0"/>
+              <a:buChar char="•"/>
+            </a:pPr>
+            <a:r>
+              <a:rPr lang="pt-BR" dirty="0"/>
+              <a:t>Exportação dos dados em CSV e JSON</a:t>
+            </a:r>
+          </a:p>
+          <a:p>
+            <a:pPr>
+              <a:buFont typeface="Arial" panose="020B0604020202020204" pitchFamily="34" charset="0"/>
+              <a:buChar char="•"/>
+            </a:pPr>
+            <a:r>
+              <a:rPr lang="pt-BR" dirty="0"/>
+              <a:t>Visualizações gráficas interativas com </a:t>
+            </a:r>
+            <a:r>
+              <a:rPr lang="pt-BR" dirty="0" err="1"/>
+              <a:t>Plotly</a:t>
+            </a:r>
+            <a:endParaRPr lang="pt-BR" dirty="0"/>
+          </a:p>
+          <a:p>
+            <a:pPr>
+              <a:buFont typeface="Arial" panose="020B0604020202020204" pitchFamily="34" charset="0"/>
+              <a:buChar char="•"/>
+            </a:pPr>
+            <a:r>
+              <a:rPr lang="pt-BR" dirty="0"/>
+              <a:t>Análises de produtividade por máquina e OP</a:t>
+            </a:r>
+          </a:p>
+          <a:p>
+            <a:pPr>
+              <a:buFont typeface="Arial" panose="020B0604020202020204" pitchFamily="34" charset="0"/>
+              <a:buChar char="•"/>
+            </a:pPr>
+            <a:r>
+              <a:rPr lang="pt-BR" dirty="0"/>
+              <a:t>Registro automatizado em banco de dados com persistência</a:t>
+            </a:r>
+          </a:p>
+        </p:txBody>
+      </p:sp>
+    </p:spTree>
+    <p:extLst>
+      <p:ext uri="{BB962C8B-B14F-4D97-AF65-F5344CB8AC3E}">
+        <p14:creationId xmlns:p14="http://schemas.microsoft.com/office/powerpoint/2010/main" val="2508316063"/>
+      </p:ext>
+    </p:extLst>
+  </p:cSld>
+  <p:clrMapOvr>
+    <a:masterClrMapping/>
+  </p:clrMapOvr>
+</p:sld>
+</file>
+
+<file path=ppt/slides/slide2.xml><?xml version="1.0" encoding="utf-8"?>
+<p:sld xmlns:a="http://schemas.openxmlformats.org/drawingml/2006/main" xmlns:r="http://schemas.openxmlformats.org/officeDocument/2006/relationships" xmlns:p="http://schemas.openxmlformats.org/presentationml/2006/main">
+  <p:cSld>
+    <p:spTree>
+      <p:nvGrpSpPr>
+        <p:cNvPr id="1" name=""/>
+        <p:cNvGrpSpPr/>
+        <p:nvPr/>
+      </p:nvGrpSpPr>
+      <p:grpSpPr>
+        <a:xfrm>
+          <a:off x="0" y="0"/>
+          <a:ext cx="0" cy="0"/>
+          <a:chOff x="0" y="0"/>
+          <a:chExt cx="0" cy="0"/>
+        </a:xfrm>
+      </p:grpSpPr>
       <p:pic>
         <p:nvPicPr>
           <p:cNvPr id="5" name="Imagem 4">
@@ -3441,7 +3751,7 @@
 </p:sld>
 </file>
 
-<file path=ppt/slides/slide2.xml><?xml version="1.0" encoding="utf-8"?>
+<file path=ppt/slides/slide3.xml><?xml version="1.0" encoding="utf-8"?>
 <p:sld xmlns:a="http://schemas.openxmlformats.org/drawingml/2006/main" xmlns:r="http://schemas.openxmlformats.org/officeDocument/2006/relationships" xmlns:p="http://schemas.openxmlformats.org/presentationml/2006/main">
   <p:cSld>
     <p:spTree>
@@ -3542,7 +3852,7 @@
 </p:sld>
 </file>
 
-<file path=ppt/slides/slide3.xml><?xml version="1.0" encoding="utf-8"?>
+<file path=ppt/slides/slide4.xml><?xml version="1.0" encoding="utf-8"?>
 <p:sld xmlns:a="http://schemas.openxmlformats.org/drawingml/2006/main" xmlns:r="http://schemas.openxmlformats.org/officeDocument/2006/relationships" xmlns:p="http://schemas.openxmlformats.org/presentationml/2006/main">
   <p:cSld>
     <p:spTree>
@@ -3673,7 +3983,7 @@
 </p:sld>
 </file>
 
-<file path=ppt/slides/slide4.xml><?xml version="1.0" encoding="utf-8"?>
+<file path=ppt/slides/slide5.xml><?xml version="1.0" encoding="utf-8"?>
 <p:sld xmlns:a="http://schemas.openxmlformats.org/drawingml/2006/main" xmlns:r="http://schemas.openxmlformats.org/officeDocument/2006/relationships" xmlns:p="http://schemas.openxmlformats.org/presentationml/2006/main">
   <p:cSld>
     <p:spTree>
@@ -3774,7 +4084,7 @@
 </p:sld>
 </file>
 
-<file path=ppt/slides/slide5.xml><?xml version="1.0" encoding="utf-8"?>
+<file path=ppt/slides/slide6.xml><?xml version="1.0" encoding="utf-8"?>
 <p:sld xmlns:a="http://schemas.openxmlformats.org/drawingml/2006/main" xmlns:r="http://schemas.openxmlformats.org/officeDocument/2006/relationships" xmlns:p="http://schemas.openxmlformats.org/presentationml/2006/main">
   <p:cSld>
     <p:spTree>
@@ -4070,7 +4380,7 @@
 </p:sld>
 </file>
 
-<file path=ppt/slides/slide6.xml><?xml version="1.0" encoding="utf-8"?>
+<file path=ppt/slides/slide7.xml><?xml version="1.0" encoding="utf-8"?>
 <p:sld xmlns:a="http://schemas.openxmlformats.org/drawingml/2006/main" xmlns:r="http://schemas.openxmlformats.org/officeDocument/2006/relationships" xmlns:p="http://schemas.openxmlformats.org/presentationml/2006/main">
   <p:cSld>
     <p:spTree>
@@ -4171,7 +4481,7 @@
 </p:sld>
 </file>
 
-<file path=ppt/slides/slide7.xml><?xml version="1.0" encoding="utf-8"?>
+<file path=ppt/slides/slide8.xml><?xml version="1.0" encoding="utf-8"?>
 <p:sld xmlns:a="http://schemas.openxmlformats.org/drawingml/2006/main" xmlns:r="http://schemas.openxmlformats.org/officeDocument/2006/relationships" xmlns:p="http://schemas.openxmlformats.org/presentationml/2006/main">
   <p:cSld>
     <p:spTree>
@@ -4272,7 +4582,7 @@
 </p:sld>
 </file>
 
-<file path=ppt/slides/slide8.xml><?xml version="1.0" encoding="utf-8"?>
+<file path=ppt/slides/slide9.xml><?xml version="1.0" encoding="utf-8"?>
 <p:sld xmlns:a="http://schemas.openxmlformats.org/drawingml/2006/main" xmlns:r="http://schemas.openxmlformats.org/officeDocument/2006/relationships" xmlns:p="http://schemas.openxmlformats.org/presentationml/2006/main">
   <p:cSld>
     <p:spTree>
@@ -4324,9 +4634,10 @@
           <a:lstStyle/>
           <a:p>
             <a:r>
-              <a:rPr lang="pt-BR" dirty="0"/>
+              <a:rPr lang="pt-BR"/>
               <a:t>6 - Visualizar gráfico: produtividade por máquina</a:t>
             </a:r>
+            <a:endParaRPr lang="pt-BR" dirty="0"/>
           </a:p>
         </p:txBody>
       </p:sp>

</xml_diff>